<commit_message>
Loading protege plugin jar files [Elise]
git-svn-id: http://nescent-anatomy-course.googlecode.com/svn/trunk/2013_course@347 586f635c-ba50-3696-6e8c-0f279cf0028a
</commit_message>
<xml_diff>
--- a/material_for_course/thurs/OntologyInteroperability.pptx
+++ b/material_for_course/thurs/OntologyInteroperability.pptx
@@ -207,7 +207,7 @@
             <a:fld id="{D231C2E4-DDFD-134D-8791-B4F38918FB42}" type="datetimeFigureOut">
               <a:rPr lang="en-US" smtClean="0"/>
               <a:pPr/>
-              <a:t>7/31/13</a:t>
+              <a:t>8/1/2013</a:t>
             </a:fld>
             <a:endParaRPr lang="en-US"/>
           </a:p>
@@ -1169,7 +1169,7 @@
             <a:fld id="{6FC0D161-5A65-D54C-A2EA-A98C2B23D5B7}" type="datetimeFigureOut">
               <a:rPr lang="en-US" smtClean="0"/>
               <a:pPr/>
-              <a:t>7/31/13</a:t>
+              <a:t>8/1/2013</a:t>
             </a:fld>
             <a:endParaRPr lang="en-US"/>
           </a:p>
@@ -1336,7 +1336,7 @@
             <a:fld id="{6FC0D161-5A65-D54C-A2EA-A98C2B23D5B7}" type="datetimeFigureOut">
               <a:rPr lang="en-US" smtClean="0"/>
               <a:pPr/>
-              <a:t>7/31/13</a:t>
+              <a:t>8/1/2013</a:t>
             </a:fld>
             <a:endParaRPr lang="en-US"/>
           </a:p>
@@ -1513,7 +1513,7 @@
             <a:fld id="{6FC0D161-5A65-D54C-A2EA-A98C2B23D5B7}" type="datetimeFigureOut">
               <a:rPr lang="en-US" smtClean="0"/>
               <a:pPr/>
-              <a:t>7/31/13</a:t>
+              <a:t>8/1/2013</a:t>
             </a:fld>
             <a:endParaRPr lang="en-US"/>
           </a:p>
@@ -1680,7 +1680,7 @@
             <a:fld id="{6FC0D161-5A65-D54C-A2EA-A98C2B23D5B7}" type="datetimeFigureOut">
               <a:rPr lang="en-US" smtClean="0"/>
               <a:pPr/>
-              <a:t>7/31/13</a:t>
+              <a:t>8/1/2013</a:t>
             </a:fld>
             <a:endParaRPr lang="en-US"/>
           </a:p>
@@ -1923,7 +1923,7 @@
             <a:fld id="{6FC0D161-5A65-D54C-A2EA-A98C2B23D5B7}" type="datetimeFigureOut">
               <a:rPr lang="en-US" smtClean="0"/>
               <a:pPr/>
-              <a:t>7/31/13</a:t>
+              <a:t>8/1/2013</a:t>
             </a:fld>
             <a:endParaRPr lang="en-US"/>
           </a:p>
@@ -2208,7 +2208,7 @@
             <a:fld id="{6FC0D161-5A65-D54C-A2EA-A98C2B23D5B7}" type="datetimeFigureOut">
               <a:rPr lang="en-US" smtClean="0"/>
               <a:pPr/>
-              <a:t>7/31/13</a:t>
+              <a:t>8/1/2013</a:t>
             </a:fld>
             <a:endParaRPr lang="en-US"/>
           </a:p>
@@ -2627,7 +2627,7 @@
             <a:fld id="{6FC0D161-5A65-D54C-A2EA-A98C2B23D5B7}" type="datetimeFigureOut">
               <a:rPr lang="en-US" smtClean="0"/>
               <a:pPr/>
-              <a:t>7/31/13</a:t>
+              <a:t>8/1/2013</a:t>
             </a:fld>
             <a:endParaRPr lang="en-US"/>
           </a:p>
@@ -2742,7 +2742,7 @@
             <a:fld id="{6FC0D161-5A65-D54C-A2EA-A98C2B23D5B7}" type="datetimeFigureOut">
               <a:rPr lang="en-US" smtClean="0"/>
               <a:pPr/>
-              <a:t>7/31/13</a:t>
+              <a:t>8/1/2013</a:t>
             </a:fld>
             <a:endParaRPr lang="en-US"/>
           </a:p>
@@ -2834,7 +2834,7 @@
             <a:fld id="{6FC0D161-5A65-D54C-A2EA-A98C2B23D5B7}" type="datetimeFigureOut">
               <a:rPr lang="en-US" smtClean="0"/>
               <a:pPr/>
-              <a:t>7/31/13</a:t>
+              <a:t>8/1/2013</a:t>
             </a:fld>
             <a:endParaRPr lang="en-US"/>
           </a:p>
@@ -3108,7 +3108,7 @@
             <a:fld id="{6FC0D161-5A65-D54C-A2EA-A98C2B23D5B7}" type="datetimeFigureOut">
               <a:rPr lang="en-US" smtClean="0"/>
               <a:pPr/>
-              <a:t>7/31/13</a:t>
+              <a:t>8/1/2013</a:t>
             </a:fld>
             <a:endParaRPr lang="en-US"/>
           </a:p>
@@ -3358,7 +3358,7 @@
             <a:fld id="{6FC0D161-5A65-D54C-A2EA-A98C2B23D5B7}" type="datetimeFigureOut">
               <a:rPr lang="en-US" smtClean="0"/>
               <a:pPr/>
-              <a:t>7/31/13</a:t>
+              <a:t>8/1/2013</a:t>
             </a:fld>
             <a:endParaRPr lang="en-US"/>
           </a:p>
@@ -3568,7 +3568,7 @@
             <a:fld id="{6FC0D161-5A65-D54C-A2EA-A98C2B23D5B7}" type="datetimeFigureOut">
               <a:rPr lang="en-US" smtClean="0"/>
               <a:pPr/>
-              <a:t>7/31/13</a:t>
+              <a:t>8/1/2013</a:t>
             </a:fld>
             <a:endParaRPr lang="en-US"/>
           </a:p>
@@ -4221,7 +4221,7 @@
             <a:graphicData uri="http://schemas.openxmlformats.org/presentationml/2006/ole">
               <mc:AlternateContent xmlns:mc="http://schemas.openxmlformats.org/markup-compatibility/2006">
                 <mc:Choice xmlns:v="urn:schemas-microsoft-com:vml" Requires="v">
-                  <p:oleObj spid="_x0000_s1040" name="Image" r:id="rId10" imgW="2387302" imgH="2971429" progId="">
+                  <p:oleObj spid="_x0000_s1041" name="Image" r:id="rId10" imgW="2387302" imgH="2971429" progId="">
                     <p:embed/>
                   </p:oleObj>
                 </mc:Choice>
@@ -4263,14 +4263,14 @@
                         </a:ln>
                         <a:effectLst/>
                         <a:extLst>
-                          <a:ext uri="{909E8E84-426E-40dd-AFC4-6F175D3DCCD1}">
+                          <a:ext uri="{909E8E84-426E-40DD-AFC4-6F175D3DCCD1}">
                             <a14:hiddenFill xmlns:a14="http://schemas.microsoft.com/office/drawing/2010/main">
                               <a:solidFill>
                                 <a:schemeClr val="accent1"/>
                               </a:solidFill>
                             </a14:hiddenFill>
                           </a:ext>
-                          <a:ext uri="{91240B29-F687-4f45-9708-019B960494DF}">
+                          <a:ext uri="{91240B29-F687-4F45-9708-019B960494DF}">
                             <a14:hiddenLine xmlns:a14="http://schemas.microsoft.com/office/drawing/2010/main" w="9525">
                               <a:solidFill>
                                 <a:schemeClr val="tx1"/>
@@ -4280,7 +4280,7 @@
                               <a:tailEnd/>
                             </a14:hiddenLine>
                           </a:ext>
-                          <a:ext uri="{AF507438-7753-43e0-B8FC-AC1667EBCBE1}">
+                          <a:ext uri="{AF507438-7753-43E0-B8FC-AC1667EBCBE1}">
                             <a14:hiddenEffects xmlns:a14="http://schemas.microsoft.com/office/drawing/2010/main">
                               <a:effectLst>
                                 <a:outerShdw blurRad="63500" dist="38099" dir="2700000" algn="ctr" rotWithShape="0">
@@ -4420,7 +4420,7 @@
   <p:timing>
     <p:tnLst>
       <p:par>
-        <p:cTn xmlns:p14="http://schemas.microsoft.com/office/powerpoint/2010/main" id="1" dur="indefinite" restart="never" nodeType="tmRoot"/>
+        <p:cTn id="1" dur="indefinite" restart="never" nodeType="tmRoot"/>
       </p:par>
     </p:tnLst>
   </p:timing>
@@ -7934,7 +7934,7 @@
   <p:timing>
     <p:tnLst>
       <p:par>
-        <p:cTn xmlns:p14="http://schemas.microsoft.com/office/powerpoint/2010/main" id="1" dur="indefinite" restart="never" nodeType="tmRoot"/>
+        <p:cTn id="1" dur="indefinite" restart="never" nodeType="tmRoot"/>
       </p:par>
     </p:tnLst>
   </p:timing>
@@ -7993,11 +7993,7 @@
           <a:p>
             <a:r>
               <a:rPr lang="en-US" sz="3200" b="1" dirty="0" smtClean="0"/>
-              <a:t>Synchronization by </a:t>
-            </a:r>
-            <a:r>
-              <a:rPr lang="en-US" sz="3200" b="1" dirty="0" smtClean="0"/>
-              <a:t>reuse from external ontologies</a:t>
+              <a:t>Synchronization by reuse from external ontologies</a:t>
             </a:r>
             <a:endParaRPr lang="en-US" sz="3200" b="1" dirty="0"/>
           </a:p>
@@ -8354,7 +8350,7 @@
   <p:timing>
     <p:tnLst>
       <p:par>
-        <p:cTn xmlns:p14="http://schemas.microsoft.com/office/powerpoint/2010/main" id="1" dur="indefinite" restart="never" nodeType="tmRoot"/>
+        <p:cTn id="1" dur="indefinite" restart="never" nodeType="tmRoot"/>
       </p:par>
     </p:tnLst>
   </p:timing>
@@ -8620,7 +8616,7 @@
   <p:timing>
     <p:tnLst>
       <p:par>
-        <p:cTn xmlns:p14="http://schemas.microsoft.com/office/powerpoint/2010/main" id="1" dur="indefinite" restart="never" nodeType="tmRoot"/>
+        <p:cTn id="1" dur="indefinite" restart="never" nodeType="tmRoot"/>
       </p:par>
     </p:tnLst>
   </p:timing>
@@ -8925,7 +8921,7 @@
   <p:timing>
     <p:tnLst>
       <p:par>
-        <p:cTn xmlns:p14="http://schemas.microsoft.com/office/powerpoint/2010/main" id="1" dur="indefinite" restart="never" nodeType="tmRoot"/>
+        <p:cTn id="1" dur="indefinite" restart="never" nodeType="tmRoot"/>
       </p:par>
     </p:tnLst>
   </p:timing>
@@ -8968,11 +8964,7 @@
           <a:p>
             <a:r>
               <a:rPr lang="en-US" dirty="0" smtClean="0"/>
-              <a:t>More about using ontologies </a:t>
-            </a:r>
-            <a:r>
-              <a:rPr lang="en-US" dirty="0" smtClean="0"/>
-              <a:t>together</a:t>
+              <a:t>More about using ontologies together</a:t>
             </a:r>
             <a:endParaRPr lang="en-US" dirty="0"/>
           </a:p>
@@ -9056,11 +9048,7 @@
             </a:r>
             <a:r>
               <a:rPr lang="en-US" sz="2400" b="1" dirty="0" smtClean="0"/>
-              <a:t>) </a:t>
-            </a:r>
-            <a:r>
-              <a:rPr lang="en-US" sz="2400" b="1" dirty="0" smtClean="0"/>
-              <a:t>and </a:t>
+              <a:t>) and </a:t>
             </a:r>
             <a:r>
               <a:rPr lang="en-US" sz="2400" b="1" dirty="0"/>
@@ -9329,7 +9317,7 @@
   <p:timing>
     <p:tnLst>
       <p:par>
-        <p:cTn xmlns:p14="http://schemas.microsoft.com/office/powerpoint/2010/main" id="1" dur="indefinite" restart="never" nodeType="tmRoot"/>
+        <p:cTn id="1" dur="indefinite" restart="never" nodeType="tmRoot"/>
       </p:par>
     </p:tnLst>
   </p:timing>
@@ -9426,16 +9414,7 @@
                 </a:solidFill>
                 <a:latin typeface="+mj-lt"/>
               </a:rPr>
-              <a:t>Ontologies can help reconcile </a:t>
-            </a:r>
-            <a:r>
-              <a:rPr lang="en-US" sz="2800" b="1" dirty="0" smtClean="0">
-                <a:solidFill>
-                  <a:srgbClr val="000000"/>
-                </a:solidFill>
-                <a:latin typeface="+mj-lt"/>
-              </a:rPr>
-              <a:t>annotations</a:t>
+              <a:t>Ontologies can help reconcile annotations</a:t>
             </a:r>
             <a:endParaRPr lang="en-US" sz="2800" b="1" dirty="0">
               <a:solidFill>
@@ -9508,7 +9487,7 @@
   <p:timing>
     <p:tnLst>
       <p:par>
-        <p:cTn xmlns:p14="http://schemas.microsoft.com/office/powerpoint/2010/main" id="1" dur="indefinite" restart="never" nodeType="tmRoot"/>
+        <p:cTn id="1" dur="indefinite" restart="never" nodeType="tmRoot"/>
       </p:par>
     </p:tnLst>
   </p:timing>
@@ -10613,17 +10592,6 @@
           <a:p>
             <a:pPr algn="ctr" defTabSz="285750"/>
             <a:r>
-              <a:rPr lang="en-US" sz="900" dirty="0" err="1" smtClean="0">
-                <a:solidFill>
-                  <a:schemeClr val="bg1"/>
-                </a:solidFill>
-                <a:latin typeface="Calibri" charset="0"/>
-                <a:ea typeface="ＭＳ Ｐゴシック" charset="-128"/>
-                <a:cs typeface="ＭＳ Ｐゴシック" charset="-128"/>
-              </a:rPr>
-              <a:t>multicellular</a:t>
-            </a:r>
-            <a:r>
               <a:rPr lang="en-US" sz="900" dirty="0" smtClean="0">
                 <a:solidFill>
                   <a:schemeClr val="bg1"/>
@@ -10632,29 +10600,7 @@
                 <a:ea typeface="ＭＳ Ｐゴシック" charset="-128"/>
                 <a:cs typeface="ＭＳ Ｐゴシック" charset="-128"/>
               </a:rPr>
-              <a:t> </a:t>
-            </a:r>
-            <a:r>
-              <a:rPr lang="en-US" sz="900" dirty="0" err="1" smtClean="0">
-                <a:solidFill>
-                  <a:schemeClr val="bg1"/>
-                </a:solidFill>
-                <a:latin typeface="Calibri" charset="0"/>
-                <a:ea typeface="ＭＳ Ｐゴシック" charset="-128"/>
-                <a:cs typeface="ＭＳ Ｐゴシック" charset="-128"/>
-              </a:rPr>
-              <a:t>organismal</a:t>
-            </a:r>
-            <a:r>
-              <a:rPr lang="en-US" sz="900" dirty="0" smtClean="0">
-                <a:solidFill>
-                  <a:schemeClr val="bg1"/>
-                </a:solidFill>
-                <a:latin typeface="Calibri" charset="0"/>
-                <a:ea typeface="ＭＳ Ｐゴシック" charset="-128"/>
-                <a:cs typeface="ＭＳ Ｐゴシック" charset="-128"/>
-              </a:rPr>
-              <a:t> process</a:t>
+              <a:t>multicellular organismal process</a:t>
             </a:r>
             <a:endParaRPr lang="en-US" sz="900" dirty="0">
               <a:solidFill>
@@ -12980,7 +12926,7 @@
   <p:timing>
     <p:tnLst>
       <p:par>
-        <p:cTn xmlns:p14="http://schemas.microsoft.com/office/powerpoint/2010/main" id="1" dur="indefinite" restart="never" nodeType="tmRoot"/>
+        <p:cTn id="1" dur="indefinite" restart="never" nodeType="tmRoot"/>
       </p:par>
     </p:tnLst>
   </p:timing>
@@ -13191,7 +13137,7 @@
   <p:timing>
     <p:tnLst>
       <p:par>
-        <p:cTn xmlns:p14="http://schemas.microsoft.com/office/powerpoint/2010/main" id="1" dur="indefinite" restart="never" nodeType="tmRoot"/>
+        <p:cTn id="1" dur="indefinite" restart="never" nodeType="tmRoot"/>
       </p:par>
     </p:tnLst>
   </p:timing>
@@ -13443,7 +13389,7 @@
   <p:timing>
     <p:tnLst>
       <p:par>
-        <p:cTn xmlns:p14="http://schemas.microsoft.com/office/powerpoint/2010/main" id="1" dur="indefinite" restart="never" nodeType="tmRoot"/>
+        <p:cTn id="1" dur="indefinite" restart="never" nodeType="tmRoot"/>
       </p:par>
     </p:tnLst>
   </p:timing>
@@ -14192,7 +14138,7 @@
   <p:timing>
     <p:tnLst>
       <p:par>
-        <p:cTn xmlns:p14="http://schemas.microsoft.com/office/powerpoint/2010/main" id="1" dur="indefinite" restart="never" nodeType="tmRoot"/>
+        <p:cTn id="1" dur="indefinite" restart="never" nodeType="tmRoot"/>
       </p:par>
     </p:tnLst>
   </p:timing>
@@ -14809,7 +14755,7 @@
   <p:timing>
     <p:tnLst>
       <p:par>
-        <p:cTn xmlns:p14="http://schemas.microsoft.com/office/powerpoint/2010/main" id="1" dur="indefinite" restart="never" nodeType="tmRoot"/>
+        <p:cTn id="1" dur="indefinite" restart="never" nodeType="tmRoot"/>
       </p:par>
     </p:tnLst>
   </p:timing>
@@ -15027,15 +14973,7 @@
             </a:r>
             <a:r>
               <a:rPr lang="en-US" sz="2400" b="1" dirty="0" smtClean="0"/>
-              <a:t> to classes in other ontologies using </a:t>
-            </a:r>
-            <a:r>
-              <a:rPr lang="en-US" sz="2400" b="1" dirty="0" smtClean="0"/>
-              <a:t>specified </a:t>
-            </a:r>
-            <a:r>
-              <a:rPr lang="en-US" sz="2400" b="1" dirty="0" smtClean="0"/>
-              <a:t>semantics. This allows merging of ontologies in taxonomically appropriate ways</a:t>
+              <a:t> to classes in other ontologies using specified semantics. This allows merging of ontologies in taxonomically appropriate ways</a:t>
             </a:r>
             <a:endParaRPr lang="en-US" sz="2400" b="1" dirty="0"/>
           </a:p>
@@ -15702,7 +15640,7 @@
   <p:timing>
     <p:tnLst>
       <p:par>
-        <p:cTn xmlns:p14="http://schemas.microsoft.com/office/powerpoint/2010/main" id="1" dur="indefinite" restart="never" nodeType="tmRoot"/>
+        <p:cTn id="1" dur="indefinite" restart="never" nodeType="tmRoot"/>
       </p:par>
     </p:tnLst>
   </p:timing>
@@ -15866,7 +15804,7 @@
   <p:timing>
     <p:tnLst>
       <p:par>
-        <p:cTn xmlns:p14="http://schemas.microsoft.com/office/powerpoint/2010/main" id="1" dur="indefinite" restart="never" nodeType="tmRoot"/>
+        <p:cTn id="1" dur="indefinite" restart="never" nodeType="tmRoot"/>
       </p:par>
     </p:tnLst>
   </p:timing>

</xml_diff>